<commit_message>
Add new system to balance the threads
</commit_message>
<xml_diff>
--- a/docs/resources/MultiHilos/Flujo.pptx
+++ b/docs/resources/MultiHilos/Flujo.pptx
@@ -105,6 +105,11 @@
       </a:defRPr>
     </a:lvl9pPr>
   </p:defaultTextStyle>
+  <p:extLst>
+    <p:ext uri="{EFAFB233-063F-42B5-8137-9DF3F51BA10A}">
+      <p15:sldGuideLst xmlns:p15="http://schemas.microsoft.com/office/powerpoint/2012/main"/>
+    </p:ext>
+  </p:extLst>
 </p:presentation>
 </file>
 
@@ -255,7 +260,7 @@
           <a:p>
             <a:fld id="{8CCF7DD9-20E7-4596-88D6-550D4EC9E834}" type="datetimeFigureOut">
               <a:rPr lang="es-ES" smtClean="0"/>
-              <a:t>07/03/2021</a:t>
+              <a:t>08/03/2021</a:t>
             </a:fld>
             <a:endParaRPr lang="es-ES"/>
           </a:p>
@@ -453,7 +458,7 @@
           <a:p>
             <a:fld id="{8CCF7DD9-20E7-4596-88D6-550D4EC9E834}" type="datetimeFigureOut">
               <a:rPr lang="es-ES" smtClean="0"/>
-              <a:t>07/03/2021</a:t>
+              <a:t>08/03/2021</a:t>
             </a:fld>
             <a:endParaRPr lang="es-ES"/>
           </a:p>
@@ -661,7 +666,7 @@
           <a:p>
             <a:fld id="{8CCF7DD9-20E7-4596-88D6-550D4EC9E834}" type="datetimeFigureOut">
               <a:rPr lang="es-ES" smtClean="0"/>
-              <a:t>07/03/2021</a:t>
+              <a:t>08/03/2021</a:t>
             </a:fld>
             <a:endParaRPr lang="es-ES"/>
           </a:p>
@@ -859,7 +864,7 @@
           <a:p>
             <a:fld id="{8CCF7DD9-20E7-4596-88D6-550D4EC9E834}" type="datetimeFigureOut">
               <a:rPr lang="es-ES" smtClean="0"/>
-              <a:t>07/03/2021</a:t>
+              <a:t>08/03/2021</a:t>
             </a:fld>
             <a:endParaRPr lang="es-ES"/>
           </a:p>
@@ -1134,7 +1139,7 @@
           <a:p>
             <a:fld id="{8CCF7DD9-20E7-4596-88D6-550D4EC9E834}" type="datetimeFigureOut">
               <a:rPr lang="es-ES" smtClean="0"/>
-              <a:t>07/03/2021</a:t>
+              <a:t>08/03/2021</a:t>
             </a:fld>
             <a:endParaRPr lang="es-ES"/>
           </a:p>
@@ -1399,7 +1404,7 @@
           <a:p>
             <a:fld id="{8CCF7DD9-20E7-4596-88D6-550D4EC9E834}" type="datetimeFigureOut">
               <a:rPr lang="es-ES" smtClean="0"/>
-              <a:t>07/03/2021</a:t>
+              <a:t>08/03/2021</a:t>
             </a:fld>
             <a:endParaRPr lang="es-ES"/>
           </a:p>
@@ -1811,7 +1816,7 @@
           <a:p>
             <a:fld id="{8CCF7DD9-20E7-4596-88D6-550D4EC9E834}" type="datetimeFigureOut">
               <a:rPr lang="es-ES" smtClean="0"/>
-              <a:t>07/03/2021</a:t>
+              <a:t>08/03/2021</a:t>
             </a:fld>
             <a:endParaRPr lang="es-ES"/>
           </a:p>
@@ -1952,7 +1957,7 @@
           <a:p>
             <a:fld id="{8CCF7DD9-20E7-4596-88D6-550D4EC9E834}" type="datetimeFigureOut">
               <a:rPr lang="es-ES" smtClean="0"/>
-              <a:t>07/03/2021</a:t>
+              <a:t>08/03/2021</a:t>
             </a:fld>
             <a:endParaRPr lang="es-ES"/>
           </a:p>
@@ -2065,7 +2070,7 @@
           <a:p>
             <a:fld id="{8CCF7DD9-20E7-4596-88D6-550D4EC9E834}" type="datetimeFigureOut">
               <a:rPr lang="es-ES" smtClean="0"/>
-              <a:t>07/03/2021</a:t>
+              <a:t>08/03/2021</a:t>
             </a:fld>
             <a:endParaRPr lang="es-ES"/>
           </a:p>
@@ -2376,7 +2381,7 @@
           <a:p>
             <a:fld id="{8CCF7DD9-20E7-4596-88D6-550D4EC9E834}" type="datetimeFigureOut">
               <a:rPr lang="es-ES" smtClean="0"/>
-              <a:t>07/03/2021</a:t>
+              <a:t>08/03/2021</a:t>
             </a:fld>
             <a:endParaRPr lang="es-ES"/>
           </a:p>
@@ -2664,7 +2669,7 @@
           <a:p>
             <a:fld id="{8CCF7DD9-20E7-4596-88D6-550D4EC9E834}" type="datetimeFigureOut">
               <a:rPr lang="es-ES" smtClean="0"/>
-              <a:t>07/03/2021</a:t>
+              <a:t>08/03/2021</a:t>
             </a:fld>
             <a:endParaRPr lang="es-ES"/>
           </a:p>
@@ -2905,7 +2910,7 @@
           <a:p>
             <a:fld id="{8CCF7DD9-20E7-4596-88D6-550D4EC9E834}" type="datetimeFigureOut">
               <a:rPr lang="es-ES" smtClean="0"/>
-              <a:t>07/03/2021</a:t>
+              <a:t>08/03/2021</a:t>
             </a:fld>
             <a:endParaRPr lang="es-ES"/>
           </a:p>
@@ -4141,7 +4146,7 @@
         </p:nvSpPr>
         <p:spPr>
           <a:xfrm>
-            <a:off x="4399514" y="2436113"/>
+            <a:off x="6087334" y="1735438"/>
             <a:ext cx="1420837" cy="604911"/>
           </a:xfrm>
           <a:prstGeom prst="roundRect">
@@ -4190,7 +4195,7 @@
         </p:nvSpPr>
         <p:spPr>
           <a:xfrm>
-            <a:off x="4370102" y="3510332"/>
+            <a:off x="6057922" y="2809657"/>
             <a:ext cx="1420837" cy="604911"/>
           </a:xfrm>
           <a:prstGeom prst="roundRect">
@@ -4239,7 +4244,7 @@
         </p:nvSpPr>
         <p:spPr>
           <a:xfrm>
-            <a:off x="4410265" y="4817315"/>
+            <a:off x="6098085" y="4116640"/>
             <a:ext cx="1420837" cy="604911"/>
           </a:xfrm>
           <a:prstGeom prst="roundRect">
@@ -4291,8 +4296,8 @@
         </p:nvCxnSpPr>
         <p:spPr>
           <a:xfrm flipV="1">
-            <a:off x="265043" y="339021"/>
-            <a:ext cx="2584174" cy="6556"/>
+            <a:off x="1587251" y="365848"/>
+            <a:ext cx="1235462" cy="1"/>
           </a:xfrm>
           <a:prstGeom prst="straightConnector1">
             <a:avLst/>
@@ -4331,7 +4336,7 @@
         </p:nvSpPr>
         <p:spPr>
           <a:xfrm>
-            <a:off x="4382645" y="6518979"/>
+            <a:off x="4749823" y="6522556"/>
             <a:ext cx="1548160" cy="236247"/>
           </a:xfrm>
           <a:prstGeom prst="rect">
@@ -4361,7 +4366,15 @@
             <a:pPr algn="ctr"/>
             <a:r>
               <a:rPr lang="es-ES" dirty="0"/>
-              <a:t>4 segundos</a:t>
+              <a:t>5</a:t>
+            </a:r>
+            <a:r>
+              <a:rPr lang="es-ES" dirty="0" smtClean="0"/>
+              <a:t> </a:t>
+            </a:r>
+            <a:r>
+              <a:rPr lang="es-ES" dirty="0"/>
+              <a:t>segundos</a:t>
             </a:r>
           </a:p>
         </p:txBody>
@@ -4380,7 +4393,7 @@
         </p:nvSpPr>
         <p:spPr>
           <a:xfrm>
-            <a:off x="5924179" y="2728387"/>
+            <a:off x="7611999" y="2027712"/>
             <a:ext cx="1589803" cy="380106"/>
           </a:xfrm>
           <a:prstGeom prst="roundRect">
@@ -4434,7 +4447,7 @@
         </p:nvSpPr>
         <p:spPr>
           <a:xfrm>
-            <a:off x="166414" y="1196352"/>
+            <a:off x="59021" y="1189595"/>
             <a:ext cx="1420837" cy="604911"/>
           </a:xfrm>
           <a:prstGeom prst="roundRect">
@@ -4541,7 +4554,7 @@
         </p:nvSpPr>
         <p:spPr>
           <a:xfrm>
-            <a:off x="2978677" y="1871982"/>
+            <a:off x="4643711" y="1201252"/>
             <a:ext cx="1420837" cy="604911"/>
           </a:xfrm>
           <a:prstGeom prst="roundRect">
@@ -4596,7 +4609,7 @@
         </p:nvSpPr>
         <p:spPr>
           <a:xfrm>
-            <a:off x="5930805" y="2305128"/>
+            <a:off x="7618625" y="1604453"/>
             <a:ext cx="1589803" cy="380106"/>
           </a:xfrm>
           <a:prstGeom prst="roundRect">
@@ -4650,7 +4663,7 @@
         </p:nvSpPr>
         <p:spPr>
           <a:xfrm>
-            <a:off x="5930805" y="3789338"/>
+            <a:off x="7618625" y="3088663"/>
             <a:ext cx="1589803" cy="380106"/>
           </a:xfrm>
           <a:prstGeom prst="roundRect">
@@ -4704,7 +4717,7 @@
         </p:nvSpPr>
         <p:spPr>
           <a:xfrm>
-            <a:off x="5930805" y="3366079"/>
+            <a:off x="7618625" y="2665404"/>
             <a:ext cx="1589803" cy="380106"/>
           </a:xfrm>
           <a:prstGeom prst="roundRect">
@@ -4758,7 +4771,7 @@
         </p:nvSpPr>
         <p:spPr>
           <a:xfrm>
-            <a:off x="5907281" y="5257733"/>
+            <a:off x="7708422" y="4567103"/>
             <a:ext cx="1589803" cy="380106"/>
           </a:xfrm>
           <a:prstGeom prst="roundRect">
@@ -4816,7 +4829,7 @@
         </p:nvSpPr>
         <p:spPr>
           <a:xfrm>
-            <a:off x="5913907" y="4834474"/>
+            <a:off x="7708422" y="4123426"/>
             <a:ext cx="1589803" cy="380106"/>
           </a:xfrm>
           <a:prstGeom prst="roundRect">
@@ -4875,9 +4888,9 @@
           <p:nvPr/>
         </p:nvCxnSpPr>
         <p:spPr>
-          <a:xfrm>
-            <a:off x="265043" y="6454899"/>
-            <a:ext cx="7232041" cy="0"/>
+          <a:xfrm flipV="1">
+            <a:off x="1479858" y="6433197"/>
+            <a:ext cx="8088091" cy="9167"/>
           </a:xfrm>
           <a:prstGeom prst="straightConnector1">
             <a:avLst/>
@@ -4916,8 +4929,8 @@
         </p:nvSpPr>
         <p:spPr>
           <a:xfrm>
-            <a:off x="265043" y="33469"/>
-            <a:ext cx="2557670" cy="258209"/>
+            <a:off x="1587251" y="33469"/>
+            <a:ext cx="1235462" cy="258209"/>
           </a:xfrm>
           <a:prstGeom prst="rect">
             <a:avLst/>
@@ -4967,7 +4980,7 @@
         </p:nvCxnSpPr>
         <p:spPr>
           <a:xfrm>
-            <a:off x="3017724" y="345577"/>
+            <a:off x="4682758" y="365848"/>
             <a:ext cx="1252330" cy="0"/>
           </a:xfrm>
           <a:prstGeom prst="straightConnector1">
@@ -5007,7 +5020,7 @@
         </p:nvSpPr>
         <p:spPr>
           <a:xfrm>
-            <a:off x="3008088" y="40025"/>
+            <a:off x="4673122" y="35522"/>
             <a:ext cx="1235462" cy="251653"/>
           </a:xfrm>
           <a:prstGeom prst="rect">
@@ -5058,7 +5071,7 @@
         </p:nvCxnSpPr>
         <p:spPr>
           <a:xfrm>
-            <a:off x="4438561" y="339021"/>
+            <a:off x="6146266" y="362307"/>
             <a:ext cx="1252330" cy="0"/>
           </a:xfrm>
           <a:prstGeom prst="straightConnector1">
@@ -5098,7 +5111,7 @@
         </p:nvSpPr>
         <p:spPr>
           <a:xfrm>
-            <a:off x="4428925" y="33469"/>
+            <a:off x="6190772" y="28398"/>
             <a:ext cx="1235462" cy="251653"/>
           </a:xfrm>
           <a:prstGeom prst="rect">
@@ -5149,7 +5162,7 @@
         </p:nvCxnSpPr>
         <p:spPr>
           <a:xfrm>
-            <a:off x="5916917" y="345577"/>
+            <a:off x="7739218" y="365848"/>
             <a:ext cx="1252330" cy="0"/>
           </a:xfrm>
           <a:prstGeom prst="straightConnector1">
@@ -5189,7 +5202,7 @@
         </p:nvSpPr>
         <p:spPr>
           <a:xfrm>
-            <a:off x="5907281" y="40025"/>
+            <a:off x="7708422" y="20069"/>
             <a:ext cx="1235462" cy="251653"/>
           </a:xfrm>
           <a:prstGeom prst="rect">
@@ -5238,7 +5251,7 @@
         </p:nvSpPr>
         <p:spPr>
           <a:xfrm>
-            <a:off x="5916917" y="1881869"/>
+            <a:off x="7604737" y="1181194"/>
             <a:ext cx="1589803" cy="380106"/>
           </a:xfrm>
           <a:prstGeom prst="roundRect">
@@ -5292,7 +5305,7 @@
         </p:nvSpPr>
         <p:spPr>
           <a:xfrm>
-            <a:off x="5930805" y="4221525"/>
+            <a:off x="7618625" y="3520850"/>
             <a:ext cx="1589803" cy="380106"/>
           </a:xfrm>
           <a:prstGeom prst="roundRect">
@@ -5346,7 +5359,7 @@
         </p:nvSpPr>
         <p:spPr>
           <a:xfrm>
-            <a:off x="5924178" y="5719003"/>
+            <a:off x="7671025" y="5018328"/>
             <a:ext cx="1589803" cy="380106"/>
           </a:xfrm>
           <a:prstGeom prst="roundRect">
@@ -5386,6 +5399,245 @@
             <a:r>
               <a:rPr lang="es-ES" dirty="0"/>
               <a:t>...</a:t>
+            </a:r>
+          </a:p>
+        </p:txBody>
+      </p:sp>
+      <p:sp>
+        <p:nvSpPr>
+          <p:cNvPr id="27" name="Rectángulo: esquinas redondeadas 3">
+            <a:extLst>
+              <a:ext uri="{FF2B5EF4-FFF2-40B4-BE49-F238E27FC236}">
+                <a16:creationId xmlns:a16="http://schemas.microsoft.com/office/drawing/2014/main" id="{5F009E31-F9F6-4D08-BEF9-B3A118433D96}"/>
+              </a:ext>
+            </a:extLst>
+          </p:cNvPr>
+          <p:cNvSpPr/>
+          <p:nvPr/>
+        </p:nvSpPr>
+        <p:spPr>
+          <a:xfrm>
+            <a:off x="3008088" y="1821220"/>
+            <a:ext cx="1420837" cy="604911"/>
+          </a:xfrm>
+          <a:prstGeom prst="roundRect">
+            <a:avLst/>
+          </a:prstGeom>
+        </p:spPr>
+        <p:style>
+          <a:lnRef idx="2">
+            <a:schemeClr val="accent1">
+              <a:shade val="50000"/>
+            </a:schemeClr>
+          </a:lnRef>
+          <a:fillRef idx="1">
+            <a:schemeClr val="accent1"/>
+          </a:fillRef>
+          <a:effectRef idx="0">
+            <a:schemeClr val="accent1"/>
+          </a:effectRef>
+          <a:fontRef idx="minor">
+            <a:schemeClr val="lt1"/>
+          </a:fontRef>
+        </p:style>
+        <p:txBody>
+          <a:bodyPr rtlCol="0" anchor="ctr"/>
+          <a:lstStyle/>
+          <a:p>
+            <a:pPr algn="ctr"/>
+            <a:r>
+              <a:rPr lang="es-ES" dirty="0"/>
+              <a:t>Input</a:t>
+            </a:r>
+          </a:p>
+        </p:txBody>
+      </p:sp>
+      <p:sp>
+        <p:nvSpPr>
+          <p:cNvPr id="28" name="Rectángulo: esquinas redondeadas 4">
+            <a:extLst>
+              <a:ext uri="{FF2B5EF4-FFF2-40B4-BE49-F238E27FC236}">
+                <a16:creationId xmlns:a16="http://schemas.microsoft.com/office/drawing/2014/main" id="{A35ABD78-92D6-44C4-8BC0-22AB7E13DB6D}"/>
+              </a:ext>
+            </a:extLst>
+          </p:cNvPr>
+          <p:cNvSpPr/>
+          <p:nvPr/>
+        </p:nvSpPr>
+        <p:spPr>
+          <a:xfrm>
+            <a:off x="3001462" y="2602174"/>
+            <a:ext cx="1420837" cy="604911"/>
+          </a:xfrm>
+          <a:prstGeom prst="roundRect">
+            <a:avLst/>
+          </a:prstGeom>
+        </p:spPr>
+        <p:style>
+          <a:lnRef idx="2">
+            <a:schemeClr val="accent1">
+              <a:shade val="50000"/>
+            </a:schemeClr>
+          </a:lnRef>
+          <a:fillRef idx="1">
+            <a:schemeClr val="accent1"/>
+          </a:fillRef>
+          <a:effectRef idx="0">
+            <a:schemeClr val="accent1"/>
+          </a:effectRef>
+          <a:fontRef idx="minor">
+            <a:schemeClr val="lt1"/>
+          </a:fontRef>
+        </p:style>
+        <p:txBody>
+          <a:bodyPr rtlCol="0" anchor="ctr"/>
+          <a:lstStyle/>
+          <a:p>
+            <a:pPr algn="ctr"/>
+            <a:r>
+              <a:rPr lang="es-ES" dirty="0"/>
+              <a:t>Render</a:t>
+            </a:r>
+          </a:p>
+        </p:txBody>
+      </p:sp>
+      <p:sp>
+        <p:nvSpPr>
+          <p:cNvPr id="30" name="Rectángulo: esquinas redondeadas 5">
+            <a:extLst>
+              <a:ext uri="{FF2B5EF4-FFF2-40B4-BE49-F238E27FC236}">
+                <a16:creationId xmlns:a16="http://schemas.microsoft.com/office/drawing/2014/main" id="{12953F56-DC25-4A3F-9529-FB8CD60FC1C1}"/>
+              </a:ext>
+            </a:extLst>
+          </p:cNvPr>
+          <p:cNvSpPr/>
+          <p:nvPr/>
+        </p:nvSpPr>
+        <p:spPr>
+          <a:xfrm>
+            <a:off x="3009357" y="3372293"/>
+            <a:ext cx="1420837" cy="604911"/>
+          </a:xfrm>
+          <a:prstGeom prst="roundRect">
+            <a:avLst/>
+          </a:prstGeom>
+        </p:spPr>
+        <p:style>
+          <a:lnRef idx="2">
+            <a:schemeClr val="accent1">
+              <a:shade val="50000"/>
+            </a:schemeClr>
+          </a:lnRef>
+          <a:fillRef idx="1">
+            <a:schemeClr val="accent1"/>
+          </a:fillRef>
+          <a:effectRef idx="0">
+            <a:schemeClr val="accent1"/>
+          </a:effectRef>
+          <a:fontRef idx="minor">
+            <a:schemeClr val="lt1"/>
+          </a:fontRef>
+        </p:style>
+        <p:txBody>
+          <a:bodyPr rtlCol="0" anchor="ctr"/>
+          <a:lstStyle/>
+          <a:p>
+            <a:pPr algn="ctr"/>
+            <a:r>
+              <a:rPr lang="es-ES" dirty="0" err="1"/>
+              <a:t>Scene</a:t>
+            </a:r>
+            <a:endParaRPr lang="es-ES" dirty="0"/>
+          </a:p>
+        </p:txBody>
+      </p:sp>
+      <p:cxnSp>
+        <p:nvCxnSpPr>
+          <p:cNvPr id="44" name="Conector recto de flecha 43">
+            <a:extLst>
+              <a:ext uri="{FF2B5EF4-FFF2-40B4-BE49-F238E27FC236}">
+                <a16:creationId xmlns:a16="http://schemas.microsoft.com/office/drawing/2014/main" id="{6AB8E426-0D39-4006-9C3C-A4C8064841CA}"/>
+              </a:ext>
+            </a:extLst>
+          </p:cNvPr>
+          <p:cNvCxnSpPr>
+            <a:cxnSpLocks/>
+          </p:cNvCxnSpPr>
+          <p:nvPr/>
+        </p:nvCxnSpPr>
+        <p:spPr>
+          <a:xfrm>
+            <a:off x="3047135" y="362307"/>
+            <a:ext cx="1252330" cy="0"/>
+          </a:xfrm>
+          <a:prstGeom prst="straightConnector1">
+            <a:avLst/>
+          </a:prstGeom>
+          <a:ln>
+            <a:headEnd type="triangle"/>
+            <a:tailEnd type="triangle"/>
+          </a:ln>
+        </p:spPr>
+        <p:style>
+          <a:lnRef idx="1">
+            <a:schemeClr val="accent1"/>
+          </a:lnRef>
+          <a:fillRef idx="0">
+            <a:schemeClr val="accent1"/>
+          </a:fillRef>
+          <a:effectRef idx="0">
+            <a:schemeClr val="accent1"/>
+          </a:effectRef>
+          <a:fontRef idx="minor">
+            <a:schemeClr val="tx1"/>
+          </a:fontRef>
+        </p:style>
+      </p:cxnSp>
+      <p:sp>
+        <p:nvSpPr>
+          <p:cNvPr id="48" name="Rectángulo 47">
+            <a:extLst>
+              <a:ext uri="{FF2B5EF4-FFF2-40B4-BE49-F238E27FC236}">
+                <a16:creationId xmlns:a16="http://schemas.microsoft.com/office/drawing/2014/main" id="{C2596258-799F-4B7E-8EFD-DA6E96315788}"/>
+              </a:ext>
+            </a:extLst>
+          </p:cNvPr>
+          <p:cNvSpPr/>
+          <p:nvPr/>
+        </p:nvSpPr>
+        <p:spPr>
+          <a:xfrm>
+            <a:off x="3047135" y="21257"/>
+            <a:ext cx="1235462" cy="251653"/>
+          </a:xfrm>
+          <a:prstGeom prst="rect">
+            <a:avLst/>
+          </a:prstGeom>
+        </p:spPr>
+        <p:style>
+          <a:lnRef idx="2">
+            <a:schemeClr val="accent1">
+              <a:shade val="50000"/>
+            </a:schemeClr>
+          </a:lnRef>
+          <a:fillRef idx="1">
+            <a:schemeClr val="accent1"/>
+          </a:fillRef>
+          <a:effectRef idx="0">
+            <a:schemeClr val="accent1"/>
+          </a:effectRef>
+          <a:fontRef idx="minor">
+            <a:schemeClr val="lt1"/>
+          </a:fontRef>
+        </p:style>
+        <p:txBody>
+          <a:bodyPr rtlCol="0" anchor="ctr"/>
+          <a:lstStyle/>
+          <a:p>
+            <a:pPr algn="ctr"/>
+            <a:r>
+              <a:rPr lang="es-ES" dirty="0"/>
+              <a:t>1 segundo</a:t>
             </a:r>
           </a:p>
         </p:txBody>

</xml_diff>